<commit_message>
start live coding session preparation
</commit_message>
<xml_diff>
--- a/unit-testing.pptx
+++ b/unit-testing.pptx
@@ -5,10 +5,10 @@
     <p:sldMasterId id="2147483660" r:id="rId1"/>
   </p:sldMasterIdLst>
   <p:notesMasterIdLst>
-    <p:notesMasterId r:id="rId54"/>
+    <p:notesMasterId r:id="rId47"/>
   </p:notesMasterIdLst>
   <p:handoutMasterIdLst>
-    <p:handoutMasterId r:id="rId55"/>
+    <p:handoutMasterId r:id="rId48"/>
   </p:handoutMasterIdLst>
   <p:sldIdLst>
     <p:sldId id="256" r:id="rId2"/>
@@ -56,18 +56,11 @@
     <p:sldId id="313" r:id="rId44"/>
     <p:sldId id="315" r:id="rId45"/>
     <p:sldId id="317" r:id="rId46"/>
-    <p:sldId id="316" r:id="rId47"/>
-    <p:sldId id="329" r:id="rId48"/>
-    <p:sldId id="318" r:id="rId49"/>
-    <p:sldId id="320" r:id="rId50"/>
-    <p:sldId id="335" r:id="rId51"/>
-    <p:sldId id="321" r:id="rId52"/>
-    <p:sldId id="324" r:id="rId53"/>
   </p:sldIdLst>
   <p:sldSz cx="9144000" cy="6858000" type="screen4x3"/>
   <p:notesSz cx="6858000" cy="9144000"/>
   <p:custDataLst>
-    <p:tags r:id="rId56"/>
+    <p:tags r:id="rId49"/>
   </p:custDataLst>
   <p:defaultTextStyle>
     <a:defPPr>
@@ -214,13 +207,6 @@
             <p14:sldId id="313"/>
             <p14:sldId id="315"/>
             <p14:sldId id="317"/>
-            <p14:sldId id="316"/>
-            <p14:sldId id="329"/>
-            <p14:sldId id="318"/>
-            <p14:sldId id="320"/>
-            <p14:sldId id="335"/>
-            <p14:sldId id="321"/>
-            <p14:sldId id="324"/>
           </p14:sldIdLst>
         </p14:section>
       </p14:sectionLst>
@@ -328,7 +314,7 @@
           <a:p>
             <a:fld id="{C1FC0164-170A-4BF4-A4BD-D14D715F17FA}" type="datetimeFigureOut">
               <a:rPr lang="en-GB" smtClean="0"/>
-              <a:t>04/06/2019</a:t>
+              <a:t>07/06/2019</a:t>
             </a:fld>
             <a:endParaRPr lang="en-GB"/>
           </a:p>
@@ -494,7 +480,7 @@
           <a:p>
             <a:fld id="{2D8C1107-DB9C-403F-8ECE-3F855F545300}" type="datetimeFigureOut">
               <a:rPr lang="en-GB" smtClean="0"/>
-              <a:t>04/06/2019</a:t>
+              <a:t>07/06/2019</a:t>
             </a:fld>
             <a:endParaRPr lang="en-GB"/>
           </a:p>
@@ -16645,675 +16631,6 @@
 </p:sld>
 </file>
 
-<file path=ppt/slides/slide46.xml><?xml version="1.0" encoding="utf-8"?>
-<p:sld xmlns:a="http://schemas.openxmlformats.org/drawingml/2006/main" xmlns:r="http://schemas.openxmlformats.org/officeDocument/2006/relationships" xmlns:p="http://schemas.openxmlformats.org/presentationml/2006/main">
-  <p:cSld>
-    <p:spTree>
-      <p:nvGrpSpPr>
-        <p:cNvPr id="1" name=""/>
-        <p:cNvGrpSpPr/>
-        <p:nvPr/>
-      </p:nvGrpSpPr>
-      <p:grpSpPr>
-        <a:xfrm>
-          <a:off x="0" y="0"/>
-          <a:ext cx="0" cy="0"/>
-          <a:chOff x="0" y="0"/>
-          <a:chExt cx="0" cy="0"/>
-        </a:xfrm>
-      </p:grpSpPr>
-      <p:sp>
-        <p:nvSpPr>
-          <p:cNvPr id="2" name="Title 1"/>
-          <p:cNvSpPr>
-            <a:spLocks noGrp="1"/>
-          </p:cNvSpPr>
-          <p:nvPr>
-            <p:ph type="title"/>
-          </p:nvPr>
-        </p:nvSpPr>
-        <p:spPr>
-          <a:xfrm>
-            <a:off x="323528" y="2708920"/>
-            <a:ext cx="8352928" cy="864096"/>
-          </a:xfrm>
-        </p:spPr>
-        <p:txBody>
-          <a:bodyPr anchor="ctr"/>
-          <a:lstStyle/>
-          <a:p>
-            <a:pPr algn="ctr"/>
-            <a:r>
-              <a:rPr lang="fr-CH" dirty="0" smtClean="0"/>
-              <a:t>Application to the </a:t>
-            </a:r>
-            <a:r>
-              <a:rPr lang="fr-CH" dirty="0" err="1" smtClean="0"/>
-              <a:t>development</a:t>
-            </a:r>
-            <a:r>
-              <a:rPr lang="fr-CH" dirty="0" smtClean="0"/>
-              <a:t> of the </a:t>
-            </a:r>
-            <a:r>
-              <a:rPr lang="fr-CH" dirty="0" err="1" smtClean="0"/>
-              <a:t>PersonManagement</a:t>
-            </a:r>
-            <a:r>
-              <a:rPr lang="fr-CH" dirty="0" smtClean="0"/>
-              <a:t> module</a:t>
-            </a:r>
-            <a:endParaRPr lang="de-CH" dirty="0"/>
-          </a:p>
-        </p:txBody>
-      </p:sp>
-    </p:spTree>
-    <p:extLst>
-      <p:ext uri="{BB962C8B-B14F-4D97-AF65-F5344CB8AC3E}">
-        <p14:creationId xmlns:p14="http://schemas.microsoft.com/office/powerpoint/2010/main" val="3148941967"/>
-      </p:ext>
-    </p:extLst>
-  </p:cSld>
-  <p:clrMapOvr>
-    <a:masterClrMapping/>
-  </p:clrMapOvr>
-  <p:timing>
-    <p:tnLst>
-      <p:par>
-        <p:cTn id="1" dur="indefinite" restart="never" nodeType="tmRoot"/>
-      </p:par>
-    </p:tnLst>
-  </p:timing>
-</p:sld>
-</file>
-
-<file path=ppt/slides/slide47.xml><?xml version="1.0" encoding="utf-8"?>
-<p:sld xmlns:a="http://schemas.openxmlformats.org/drawingml/2006/main" xmlns:r="http://schemas.openxmlformats.org/officeDocument/2006/relationships" xmlns:p="http://schemas.openxmlformats.org/presentationml/2006/main">
-  <p:cSld>
-    <p:spTree>
-      <p:nvGrpSpPr>
-        <p:cNvPr id="1" name=""/>
-        <p:cNvGrpSpPr/>
-        <p:nvPr/>
-      </p:nvGrpSpPr>
-      <p:grpSpPr>
-        <a:xfrm>
-          <a:off x="0" y="0"/>
-          <a:ext cx="0" cy="0"/>
-          <a:chOff x="0" y="0"/>
-          <a:chExt cx="0" cy="0"/>
-        </a:xfrm>
-      </p:grpSpPr>
-      <p:sp>
-        <p:nvSpPr>
-          <p:cNvPr id="2" name="Title 1"/>
-          <p:cNvSpPr>
-            <a:spLocks noGrp="1"/>
-          </p:cNvSpPr>
-          <p:nvPr>
-            <p:ph type="title"/>
-          </p:nvPr>
-        </p:nvSpPr>
-        <p:spPr/>
-        <p:txBody>
-          <a:bodyPr/>
-          <a:lstStyle/>
-          <a:p>
-            <a:r>
-              <a:rPr lang="fr-CH" dirty="0" err="1" smtClean="0"/>
-              <a:t>Executable</a:t>
-            </a:r>
-            <a:r>
-              <a:rPr lang="fr-CH" dirty="0" smtClean="0"/>
-              <a:t> </a:t>
-            </a:r>
-            <a:r>
-              <a:rPr lang="fr-CH" dirty="0" err="1" smtClean="0"/>
-              <a:t>specification</a:t>
-            </a:r>
-            <a:r>
-              <a:rPr lang="fr-CH" dirty="0" smtClean="0"/>
-              <a:t> </a:t>
-            </a:r>
-            <a:r>
-              <a:rPr lang="fr-CH" dirty="0" err="1" smtClean="0"/>
-              <a:t>tools</a:t>
-            </a:r>
-            <a:endParaRPr lang="de-CH" dirty="0"/>
-          </a:p>
-        </p:txBody>
-      </p:sp>
-      <p:sp>
-        <p:nvSpPr>
-          <p:cNvPr id="3" name="Content Placeholder 2"/>
-          <p:cNvSpPr>
-            <a:spLocks noGrp="1"/>
-          </p:cNvSpPr>
-          <p:nvPr>
-            <p:ph idx="1"/>
-          </p:nvPr>
-        </p:nvSpPr>
-        <p:spPr/>
-        <p:txBody>
-          <a:bodyPr/>
-          <a:lstStyle/>
-          <a:p>
-            <a:r>
-              <a:rPr lang="de-CH" dirty="0">
-                <a:hlinkClick r:id="rId2"/>
-              </a:rPr>
-              <a:t>https://jp-lambert.me/comparing-executable-specification-tools-b7081cc26315</a:t>
-            </a:r>
-            <a:endParaRPr lang="de-CH" dirty="0"/>
-          </a:p>
-        </p:txBody>
-      </p:sp>
-      <p:sp>
-        <p:nvSpPr>
-          <p:cNvPr id="4" name="Subtitle 3"/>
-          <p:cNvSpPr>
-            <a:spLocks noGrp="1"/>
-          </p:cNvSpPr>
-          <p:nvPr>
-            <p:ph type="subTitle" idx="13"/>
-          </p:nvPr>
-        </p:nvSpPr>
-        <p:spPr/>
-        <p:txBody>
-          <a:bodyPr/>
-          <a:lstStyle/>
-          <a:p>
-            <a:r>
-              <a:rPr lang="fr-CH" dirty="0" err="1" smtClean="0"/>
-              <a:t>Some</a:t>
-            </a:r>
-            <a:r>
-              <a:rPr lang="fr-CH" dirty="0" smtClean="0"/>
-              <a:t> </a:t>
-            </a:r>
-            <a:r>
-              <a:rPr lang="fr-CH" dirty="0" err="1" smtClean="0"/>
-              <a:t>references</a:t>
-            </a:r>
-            <a:endParaRPr lang="de-CH" dirty="0"/>
-          </a:p>
-        </p:txBody>
-      </p:sp>
-    </p:spTree>
-    <p:extLst>
-      <p:ext uri="{BB962C8B-B14F-4D97-AF65-F5344CB8AC3E}">
-        <p14:creationId xmlns:p14="http://schemas.microsoft.com/office/powerpoint/2010/main" val="4241470338"/>
-      </p:ext>
-    </p:extLst>
-  </p:cSld>
-  <p:clrMapOvr>
-    <a:masterClrMapping/>
-  </p:clrMapOvr>
-  <p:timing>
-    <p:tnLst>
-      <p:par>
-        <p:cTn id="1" dur="indefinite" restart="never" nodeType="tmRoot"/>
-      </p:par>
-    </p:tnLst>
-  </p:timing>
-</p:sld>
-</file>
-
-<file path=ppt/slides/slide48.xml><?xml version="1.0" encoding="utf-8"?>
-<p:sld xmlns:a="http://schemas.openxmlformats.org/drawingml/2006/main" xmlns:r="http://schemas.openxmlformats.org/officeDocument/2006/relationships" xmlns:p="http://schemas.openxmlformats.org/presentationml/2006/main">
-  <p:cSld>
-    <p:spTree>
-      <p:nvGrpSpPr>
-        <p:cNvPr id="1" name=""/>
-        <p:cNvGrpSpPr/>
-        <p:nvPr/>
-      </p:nvGrpSpPr>
-      <p:grpSpPr>
-        <a:xfrm>
-          <a:off x="0" y="0"/>
-          <a:ext cx="0" cy="0"/>
-          <a:chOff x="0" y="0"/>
-          <a:chExt cx="0" cy="0"/>
-        </a:xfrm>
-      </p:grpSpPr>
-      <p:sp>
-        <p:nvSpPr>
-          <p:cNvPr id="2" name="Title 1"/>
-          <p:cNvSpPr>
-            <a:spLocks noGrp="1"/>
-          </p:cNvSpPr>
-          <p:nvPr>
-            <p:ph type="title"/>
-          </p:nvPr>
-        </p:nvSpPr>
-        <p:spPr/>
-        <p:txBody>
-          <a:bodyPr/>
-          <a:lstStyle/>
-          <a:p>
-            <a:r>
-              <a:rPr lang="fr-CH" dirty="0" err="1" smtClean="0"/>
-              <a:t>Specifying</a:t>
-            </a:r>
-            <a:r>
-              <a:rPr lang="fr-CH" dirty="0" smtClean="0"/>
-              <a:t> the modules </a:t>
-            </a:r>
-            <a:r>
-              <a:rPr lang="fr-CH" dirty="0" err="1" smtClean="0"/>
-              <a:t>features</a:t>
-            </a:r>
-            <a:endParaRPr lang="de-CH" dirty="0"/>
-          </a:p>
-        </p:txBody>
-      </p:sp>
-      <p:sp>
-        <p:nvSpPr>
-          <p:cNvPr id="3" name="Content Placeholder 2"/>
-          <p:cNvSpPr>
-            <a:spLocks noGrp="1"/>
-          </p:cNvSpPr>
-          <p:nvPr>
-            <p:ph idx="1"/>
-          </p:nvPr>
-        </p:nvSpPr>
-        <p:spPr>
-          <a:xfrm>
-            <a:off x="467544" y="1628775"/>
-            <a:ext cx="8352928" cy="1224161"/>
-          </a:xfrm>
-        </p:spPr>
-        <p:txBody>
-          <a:bodyPr/>
-          <a:lstStyle/>
-          <a:p>
-            <a:r>
-              <a:rPr lang="fr-CH" dirty="0" smtClean="0"/>
-              <a:t>Install Visual </a:t>
-            </a:r>
-            <a:r>
-              <a:rPr lang="fr-CH" dirty="0" err="1" smtClean="0"/>
-              <a:t>Studio’s</a:t>
-            </a:r>
-            <a:r>
-              <a:rPr lang="fr-CH" dirty="0" smtClean="0"/>
-              <a:t> </a:t>
-            </a:r>
-            <a:r>
-              <a:rPr lang="fr-CH" dirty="0" err="1" smtClean="0"/>
-              <a:t>SpecFlow</a:t>
-            </a:r>
-            <a:r>
-              <a:rPr lang="fr-CH" dirty="0" smtClean="0"/>
-              <a:t> extension</a:t>
-            </a:r>
-          </a:p>
-          <a:p>
-            <a:r>
-              <a:rPr lang="fr-CH" dirty="0" err="1" smtClean="0"/>
-              <a:t>Create</a:t>
-            </a:r>
-            <a:r>
-              <a:rPr lang="fr-CH" dirty="0" smtClean="0"/>
-              <a:t> a new </a:t>
-            </a:r>
-            <a:r>
-              <a:rPr lang="fr-CH" dirty="0" err="1" smtClean="0"/>
-              <a:t>LiveSim</a:t>
-            </a:r>
-            <a:r>
-              <a:rPr lang="fr-CH" dirty="0" smtClean="0"/>
-              <a:t> Application and Module Template</a:t>
-            </a:r>
-          </a:p>
-          <a:p>
-            <a:r>
-              <a:rPr lang="fr-CH" dirty="0" err="1" smtClean="0"/>
-              <a:t>Add</a:t>
-            </a:r>
-            <a:r>
-              <a:rPr lang="fr-CH" dirty="0" smtClean="0"/>
-              <a:t> a new «Unit Test Project </a:t>
-            </a:r>
-            <a:r>
-              <a:rPr lang="fr-CH" b="1" dirty="0" smtClean="0"/>
-              <a:t>(.NET Framework)</a:t>
-            </a:r>
-            <a:r>
-              <a:rPr lang="fr-CH" dirty="0" smtClean="0"/>
-              <a:t>»</a:t>
-            </a:r>
-            <a:endParaRPr lang="de-CH" dirty="0"/>
-          </a:p>
-        </p:txBody>
-      </p:sp>
-      <p:sp>
-        <p:nvSpPr>
-          <p:cNvPr id="4" name="Subtitle 3"/>
-          <p:cNvSpPr>
-            <a:spLocks noGrp="1"/>
-          </p:cNvSpPr>
-          <p:nvPr>
-            <p:ph type="subTitle" idx="13"/>
-          </p:nvPr>
-        </p:nvSpPr>
-        <p:spPr/>
-        <p:txBody>
-          <a:bodyPr/>
-          <a:lstStyle/>
-          <a:p>
-            <a:r>
-              <a:rPr lang="fr-CH" dirty="0" err="1" smtClean="0"/>
-              <a:t>SpecFlow</a:t>
-            </a:r>
-            <a:r>
-              <a:rPr lang="fr-CH" dirty="0" smtClean="0"/>
-              <a:t> installation</a:t>
-            </a:r>
-            <a:endParaRPr lang="de-CH" dirty="0"/>
-          </a:p>
-        </p:txBody>
-      </p:sp>
-      <p:sp>
-        <p:nvSpPr>
-          <p:cNvPr id="5" name="Rectangle 4"/>
-          <p:cNvSpPr/>
-          <p:nvPr/>
-        </p:nvSpPr>
-        <p:spPr>
-          <a:xfrm>
-            <a:off x="5436096" y="832385"/>
-            <a:ext cx="3762633" cy="369332"/>
-          </a:xfrm>
-          <a:prstGeom prst="rect">
-            <a:avLst/>
-          </a:prstGeom>
-        </p:spPr>
-        <p:txBody>
-          <a:bodyPr wrap="none">
-            <a:spAutoFit/>
-          </a:bodyPr>
-          <a:lstStyle/>
-          <a:p>
-            <a:r>
-              <a:rPr lang="de-CH" dirty="0">
-                <a:hlinkClick r:id="rId2"/>
-              </a:rPr>
-              <a:t>https://specflow.org/getting-started/</a:t>
-            </a:r>
-            <a:endParaRPr lang="de-CH" dirty="0"/>
-          </a:p>
-        </p:txBody>
-      </p:sp>
-      <p:pic>
-        <p:nvPicPr>
-          <p:cNvPr id="7" name="Picture 6"/>
-          <p:cNvPicPr>
-            <a:picLocks noChangeAspect="1"/>
-          </p:cNvPicPr>
-          <p:nvPr/>
-        </p:nvPicPr>
-        <p:blipFill>
-          <a:blip r:embed="rId3"/>
-          <a:stretch>
-            <a:fillRect/>
-          </a:stretch>
-        </p:blipFill>
-        <p:spPr>
-          <a:xfrm>
-            <a:off x="611560" y="2780928"/>
-            <a:ext cx="5129585" cy="3559638"/>
-          </a:xfrm>
-          <a:prstGeom prst="rect">
-            <a:avLst/>
-          </a:prstGeom>
-        </p:spPr>
-      </p:pic>
-    </p:spTree>
-    <p:extLst>
-      <p:ext uri="{BB962C8B-B14F-4D97-AF65-F5344CB8AC3E}">
-        <p14:creationId xmlns:p14="http://schemas.microsoft.com/office/powerpoint/2010/main" val="504483968"/>
-      </p:ext>
-    </p:extLst>
-  </p:cSld>
-  <p:clrMapOvr>
-    <a:masterClrMapping/>
-  </p:clrMapOvr>
-  <p:timing>
-    <p:tnLst>
-      <p:par>
-        <p:cTn id="1" dur="indefinite" restart="never" nodeType="tmRoot"/>
-      </p:par>
-    </p:tnLst>
-  </p:timing>
-</p:sld>
-</file>
-
-<file path=ppt/slides/slide49.xml><?xml version="1.0" encoding="utf-8"?>
-<p:sld xmlns:a="http://schemas.openxmlformats.org/drawingml/2006/main" xmlns:r="http://schemas.openxmlformats.org/officeDocument/2006/relationships" xmlns:p="http://schemas.openxmlformats.org/presentationml/2006/main">
-  <p:cSld>
-    <p:spTree>
-      <p:nvGrpSpPr>
-        <p:cNvPr id="1" name=""/>
-        <p:cNvGrpSpPr/>
-        <p:nvPr/>
-      </p:nvGrpSpPr>
-      <p:grpSpPr>
-        <a:xfrm>
-          <a:off x="0" y="0"/>
-          <a:ext cx="0" cy="0"/>
-          <a:chOff x="0" y="0"/>
-          <a:chExt cx="0" cy="0"/>
-        </a:xfrm>
-      </p:grpSpPr>
-      <p:sp>
-        <p:nvSpPr>
-          <p:cNvPr id="2" name="Title 1"/>
-          <p:cNvSpPr>
-            <a:spLocks noGrp="1"/>
-          </p:cNvSpPr>
-          <p:nvPr>
-            <p:ph type="title"/>
-          </p:nvPr>
-        </p:nvSpPr>
-        <p:spPr/>
-        <p:txBody>
-          <a:bodyPr/>
-          <a:lstStyle/>
-          <a:p>
-            <a:r>
-              <a:rPr lang="fr-CH" dirty="0" err="1" smtClean="0"/>
-              <a:t>Specifying</a:t>
-            </a:r>
-            <a:r>
-              <a:rPr lang="fr-CH" dirty="0" smtClean="0"/>
-              <a:t> the modules </a:t>
-            </a:r>
-            <a:r>
-              <a:rPr lang="fr-CH" dirty="0" err="1" smtClean="0"/>
-              <a:t>features</a:t>
-            </a:r>
-            <a:endParaRPr lang="de-CH" dirty="0"/>
-          </a:p>
-        </p:txBody>
-      </p:sp>
-      <p:sp>
-        <p:nvSpPr>
-          <p:cNvPr id="3" name="Content Placeholder 2"/>
-          <p:cNvSpPr>
-            <a:spLocks noGrp="1"/>
-          </p:cNvSpPr>
-          <p:nvPr>
-            <p:ph idx="1"/>
-          </p:nvPr>
-        </p:nvSpPr>
-        <p:spPr>
-          <a:xfrm>
-            <a:off x="467544" y="1628776"/>
-            <a:ext cx="8352928" cy="324792"/>
-          </a:xfrm>
-        </p:spPr>
-        <p:txBody>
-          <a:bodyPr/>
-          <a:lstStyle/>
-          <a:p>
-            <a:r>
-              <a:rPr lang="fr-CH" dirty="0" smtClean="0"/>
-              <a:t>Install </a:t>
-            </a:r>
-            <a:r>
-              <a:rPr lang="fr-CH" dirty="0" err="1" smtClean="0"/>
-              <a:t>SpecFlow</a:t>
-            </a:r>
-            <a:r>
-              <a:rPr lang="fr-CH" dirty="0" smtClean="0"/>
-              <a:t>, </a:t>
-            </a:r>
-            <a:r>
-              <a:rPr lang="fr-CH" dirty="0" err="1" smtClean="0"/>
-              <a:t>SpecFlow.MsTest</a:t>
-            </a:r>
-            <a:r>
-              <a:rPr lang="fr-CH" dirty="0" smtClean="0"/>
-              <a:t>, and </a:t>
-            </a:r>
-            <a:r>
-              <a:rPr lang="fr-CH" dirty="0" err="1" smtClean="0"/>
-              <a:t>SpecFlow.Tools.MsBuild.Generation</a:t>
-            </a:r>
-            <a:r>
-              <a:rPr lang="fr-CH" dirty="0" smtClean="0"/>
-              <a:t> </a:t>
-            </a:r>
-            <a:r>
-              <a:rPr lang="fr-CH" dirty="0" err="1" smtClean="0"/>
-              <a:t>nuget</a:t>
-            </a:r>
-            <a:r>
-              <a:rPr lang="fr-CH" dirty="0" smtClean="0"/>
-              <a:t> packages in </a:t>
-            </a:r>
-            <a:r>
-              <a:rPr lang="fr-CH" dirty="0"/>
-              <a:t>t</a:t>
-            </a:r>
-            <a:r>
-              <a:rPr lang="fr-CH" dirty="0" smtClean="0"/>
-              <a:t>est </a:t>
-            </a:r>
-            <a:r>
-              <a:rPr lang="fr-CH" dirty="0" err="1" smtClean="0"/>
-              <a:t>project</a:t>
-            </a:r>
-            <a:endParaRPr lang="fr-CH" dirty="0" smtClean="0"/>
-          </a:p>
-          <a:p>
-            <a:endParaRPr lang="de-CH" dirty="0"/>
-          </a:p>
-        </p:txBody>
-      </p:sp>
-      <p:sp>
-        <p:nvSpPr>
-          <p:cNvPr id="4" name="Subtitle 3"/>
-          <p:cNvSpPr>
-            <a:spLocks noGrp="1"/>
-          </p:cNvSpPr>
-          <p:nvPr>
-            <p:ph type="subTitle" idx="13"/>
-          </p:nvPr>
-        </p:nvSpPr>
-        <p:spPr/>
-        <p:txBody>
-          <a:bodyPr/>
-          <a:lstStyle/>
-          <a:p>
-            <a:r>
-              <a:rPr lang="fr-CH" dirty="0" err="1" smtClean="0"/>
-              <a:t>SpecFlow</a:t>
-            </a:r>
-            <a:r>
-              <a:rPr lang="fr-CH" dirty="0" smtClean="0"/>
-              <a:t> configuration</a:t>
-            </a:r>
-            <a:endParaRPr lang="de-CH" dirty="0"/>
-          </a:p>
-        </p:txBody>
-      </p:sp>
-      <p:sp>
-        <p:nvSpPr>
-          <p:cNvPr id="5" name="Rectangle 4"/>
-          <p:cNvSpPr/>
-          <p:nvPr/>
-        </p:nvSpPr>
-        <p:spPr>
-          <a:xfrm>
-            <a:off x="5436096" y="832385"/>
-            <a:ext cx="3762633" cy="369332"/>
-          </a:xfrm>
-          <a:prstGeom prst="rect">
-            <a:avLst/>
-          </a:prstGeom>
-        </p:spPr>
-        <p:txBody>
-          <a:bodyPr wrap="none">
-            <a:spAutoFit/>
-          </a:bodyPr>
-          <a:lstStyle/>
-          <a:p>
-            <a:r>
-              <a:rPr lang="de-CH" dirty="0">
-                <a:hlinkClick r:id="rId2"/>
-              </a:rPr>
-              <a:t>https://specflow.org/getting-started/</a:t>
-            </a:r>
-            <a:endParaRPr lang="de-CH" dirty="0"/>
-          </a:p>
-        </p:txBody>
-      </p:sp>
-      <p:pic>
-        <p:nvPicPr>
-          <p:cNvPr id="6" name="Picture 5"/>
-          <p:cNvPicPr>
-            <a:picLocks noChangeAspect="1"/>
-          </p:cNvPicPr>
-          <p:nvPr/>
-        </p:nvPicPr>
-        <p:blipFill>
-          <a:blip r:embed="rId3"/>
-          <a:stretch>
-            <a:fillRect/>
-          </a:stretch>
-        </p:blipFill>
-        <p:spPr>
-          <a:xfrm>
-            <a:off x="1331640" y="2345200"/>
-            <a:ext cx="5763369" cy="3956940"/>
-          </a:xfrm>
-          <a:prstGeom prst="rect">
-            <a:avLst/>
-          </a:prstGeom>
-        </p:spPr>
-      </p:pic>
-    </p:spTree>
-    <p:extLst>
-      <p:ext uri="{BB962C8B-B14F-4D97-AF65-F5344CB8AC3E}">
-        <p14:creationId xmlns:p14="http://schemas.microsoft.com/office/powerpoint/2010/main" val="3755411586"/>
-      </p:ext>
-    </p:extLst>
-  </p:cSld>
-  <p:clrMapOvr>
-    <a:masterClrMapping/>
-  </p:clrMapOvr>
-  <p:timing>
-    <p:tnLst>
-      <p:par>
-        <p:cTn id="1" dur="indefinite" restart="never" nodeType="tmRoot"/>
-      </p:par>
-    </p:tnLst>
-  </p:timing>
-</p:sld>
-</file>
-
 <file path=ppt/slides/slide5.xml><?xml version="1.0" encoding="utf-8"?>
 <p:sld xmlns:a="http://schemas.openxmlformats.org/drawingml/2006/main" xmlns:r="http://schemas.openxmlformats.org/officeDocument/2006/relationships" xmlns:p="http://schemas.openxmlformats.org/presentationml/2006/main">
   <p:cSld>
@@ -17430,679 +16747,6 @@
     <p:extLst>
       <p:ext uri="{BB962C8B-B14F-4D97-AF65-F5344CB8AC3E}">
         <p14:creationId xmlns:p14="http://schemas.microsoft.com/office/powerpoint/2010/main" val="1223200568"/>
-      </p:ext>
-    </p:extLst>
-  </p:cSld>
-  <p:clrMapOvr>
-    <a:masterClrMapping/>
-  </p:clrMapOvr>
-  <p:timing>
-    <p:tnLst>
-      <p:par>
-        <p:cTn id="1" dur="indefinite" restart="never" nodeType="tmRoot"/>
-      </p:par>
-    </p:tnLst>
-  </p:timing>
-</p:sld>
-</file>
-
-<file path=ppt/slides/slide50.xml><?xml version="1.0" encoding="utf-8"?>
-<p:sld xmlns:a="http://schemas.openxmlformats.org/drawingml/2006/main" xmlns:r="http://schemas.openxmlformats.org/officeDocument/2006/relationships" xmlns:p="http://schemas.openxmlformats.org/presentationml/2006/main">
-  <p:cSld>
-    <p:spTree>
-      <p:nvGrpSpPr>
-        <p:cNvPr id="1" name=""/>
-        <p:cNvGrpSpPr/>
-        <p:nvPr/>
-      </p:nvGrpSpPr>
-      <p:grpSpPr>
-        <a:xfrm>
-          <a:off x="0" y="0"/>
-          <a:ext cx="0" cy="0"/>
-          <a:chOff x="0" y="0"/>
-          <a:chExt cx="0" cy="0"/>
-        </a:xfrm>
-      </p:grpSpPr>
-      <p:sp>
-        <p:nvSpPr>
-          <p:cNvPr id="2" name="Title 1"/>
-          <p:cNvSpPr>
-            <a:spLocks noGrp="1"/>
-          </p:cNvSpPr>
-          <p:nvPr>
-            <p:ph type="title"/>
-          </p:nvPr>
-        </p:nvSpPr>
-        <p:spPr/>
-        <p:txBody>
-          <a:bodyPr/>
-          <a:lstStyle/>
-          <a:p>
-            <a:r>
-              <a:rPr lang="fr-CH" dirty="0" err="1"/>
-              <a:t>Specifying</a:t>
-            </a:r>
-            <a:r>
-              <a:rPr lang="fr-CH" dirty="0"/>
-              <a:t> the modules </a:t>
-            </a:r>
-            <a:r>
-              <a:rPr lang="fr-CH" dirty="0" err="1"/>
-              <a:t>features</a:t>
-            </a:r>
-            <a:endParaRPr lang="de-CH" dirty="0"/>
-          </a:p>
-        </p:txBody>
-      </p:sp>
-      <p:sp>
-        <p:nvSpPr>
-          <p:cNvPr id="4" name="Subtitle 3"/>
-          <p:cNvSpPr>
-            <a:spLocks noGrp="1"/>
-          </p:cNvSpPr>
-          <p:nvPr>
-            <p:ph type="subTitle" idx="13"/>
-          </p:nvPr>
-        </p:nvSpPr>
-        <p:spPr/>
-        <p:txBody>
-          <a:bodyPr/>
-          <a:lstStyle/>
-          <a:p>
-            <a:r>
-              <a:rPr lang="fr-CH" dirty="0" err="1"/>
-              <a:t>SpecFlow</a:t>
-            </a:r>
-            <a:r>
-              <a:rPr lang="fr-CH" dirty="0"/>
-              <a:t> </a:t>
-            </a:r>
-            <a:r>
-              <a:rPr lang="fr-CH" dirty="0" smtClean="0"/>
-              <a:t>configuration</a:t>
-            </a:r>
-            <a:endParaRPr lang="de-CH" dirty="0"/>
-          </a:p>
-        </p:txBody>
-      </p:sp>
-      <p:pic>
-        <p:nvPicPr>
-          <p:cNvPr id="5" name="Picture 4"/>
-          <p:cNvPicPr>
-            <a:picLocks noChangeAspect="1"/>
-          </p:cNvPicPr>
-          <p:nvPr/>
-        </p:nvPicPr>
-        <p:blipFill>
-          <a:blip r:embed="rId2"/>
-          <a:stretch>
-            <a:fillRect/>
-          </a:stretch>
-        </p:blipFill>
-        <p:spPr>
-          <a:xfrm>
-            <a:off x="467544" y="2204864"/>
-            <a:ext cx="4884254" cy="2837706"/>
-          </a:xfrm>
-          <a:prstGeom prst="rect">
-            <a:avLst/>
-          </a:prstGeom>
-        </p:spPr>
-      </p:pic>
-      <p:pic>
-        <p:nvPicPr>
-          <p:cNvPr id="6" name="Picture 5"/>
-          <p:cNvPicPr>
-            <a:picLocks noChangeAspect="1"/>
-          </p:cNvPicPr>
-          <p:nvPr/>
-        </p:nvPicPr>
-        <p:blipFill>
-          <a:blip r:embed="rId3"/>
-          <a:stretch>
-            <a:fillRect/>
-          </a:stretch>
-        </p:blipFill>
-        <p:spPr>
-          <a:xfrm>
-            <a:off x="5566600" y="2420888"/>
-            <a:ext cx="3255182" cy="2205123"/>
-          </a:xfrm>
-          <a:prstGeom prst="rect">
-            <a:avLst/>
-          </a:prstGeom>
-        </p:spPr>
-      </p:pic>
-    </p:spTree>
-    <p:extLst>
-      <p:ext uri="{BB962C8B-B14F-4D97-AF65-F5344CB8AC3E}">
-        <p14:creationId xmlns:p14="http://schemas.microsoft.com/office/powerpoint/2010/main" val="1560348710"/>
-      </p:ext>
-    </p:extLst>
-  </p:cSld>
-  <p:clrMapOvr>
-    <a:masterClrMapping/>
-  </p:clrMapOvr>
-  <p:timing>
-    <p:tnLst>
-      <p:par>
-        <p:cTn id="1" dur="indefinite" restart="never" nodeType="tmRoot"/>
-      </p:par>
-    </p:tnLst>
-  </p:timing>
-</p:sld>
-</file>
-
-<file path=ppt/slides/slide51.xml><?xml version="1.0" encoding="utf-8"?>
-<p:sld xmlns:a="http://schemas.openxmlformats.org/drawingml/2006/main" xmlns:r="http://schemas.openxmlformats.org/officeDocument/2006/relationships" xmlns:p="http://schemas.openxmlformats.org/presentationml/2006/main">
-  <p:cSld>
-    <p:spTree>
-      <p:nvGrpSpPr>
-        <p:cNvPr id="1" name=""/>
-        <p:cNvGrpSpPr/>
-        <p:nvPr/>
-      </p:nvGrpSpPr>
-      <p:grpSpPr>
-        <a:xfrm>
-          <a:off x="0" y="0"/>
-          <a:ext cx="0" cy="0"/>
-          <a:chOff x="0" y="0"/>
-          <a:chExt cx="0" cy="0"/>
-        </a:xfrm>
-      </p:grpSpPr>
-      <p:sp>
-        <p:nvSpPr>
-          <p:cNvPr id="2" name="Title 1"/>
-          <p:cNvSpPr>
-            <a:spLocks noGrp="1"/>
-          </p:cNvSpPr>
-          <p:nvPr>
-            <p:ph type="title"/>
-          </p:nvPr>
-        </p:nvSpPr>
-        <p:spPr/>
-        <p:txBody>
-          <a:bodyPr/>
-          <a:lstStyle/>
-          <a:p>
-            <a:r>
-              <a:rPr lang="fr-CH" dirty="0" err="1" smtClean="0"/>
-              <a:t>Specifying</a:t>
-            </a:r>
-            <a:r>
-              <a:rPr lang="fr-CH" dirty="0" smtClean="0"/>
-              <a:t> the modules </a:t>
-            </a:r>
-            <a:r>
-              <a:rPr lang="fr-CH" dirty="0" err="1" smtClean="0"/>
-              <a:t>features</a:t>
-            </a:r>
-            <a:endParaRPr lang="de-CH" dirty="0"/>
-          </a:p>
-        </p:txBody>
-      </p:sp>
-      <p:sp>
-        <p:nvSpPr>
-          <p:cNvPr id="4" name="Subtitle 3"/>
-          <p:cNvSpPr>
-            <a:spLocks noGrp="1"/>
-          </p:cNvSpPr>
-          <p:nvPr>
-            <p:ph type="subTitle" idx="13"/>
-          </p:nvPr>
-        </p:nvSpPr>
-        <p:spPr/>
-        <p:txBody>
-          <a:bodyPr/>
-          <a:lstStyle/>
-          <a:p>
-            <a:r>
-              <a:rPr lang="fr-CH" dirty="0" err="1" smtClean="0"/>
-              <a:t>Creating</a:t>
-            </a:r>
-            <a:r>
-              <a:rPr lang="fr-CH" dirty="0" smtClean="0"/>
-              <a:t> </a:t>
-            </a:r>
-            <a:r>
-              <a:rPr lang="fr-CH" dirty="0" err="1" smtClean="0"/>
-              <a:t>feature</a:t>
-            </a:r>
-            <a:r>
-              <a:rPr lang="fr-CH" dirty="0" smtClean="0"/>
-              <a:t> file</a:t>
-            </a:r>
-            <a:endParaRPr lang="de-CH" dirty="0"/>
-          </a:p>
-        </p:txBody>
-      </p:sp>
-      <p:pic>
-        <p:nvPicPr>
-          <p:cNvPr id="6" name="Picture 5"/>
-          <p:cNvPicPr>
-            <a:picLocks noChangeAspect="1"/>
-          </p:cNvPicPr>
-          <p:nvPr/>
-        </p:nvPicPr>
-        <p:blipFill>
-          <a:blip r:embed="rId2"/>
-          <a:stretch>
-            <a:fillRect/>
-          </a:stretch>
-        </p:blipFill>
-        <p:spPr>
-          <a:xfrm>
-            <a:off x="1616085" y="1340768"/>
-            <a:ext cx="6055846" cy="4218607"/>
-          </a:xfrm>
-          <a:prstGeom prst="rect">
-            <a:avLst/>
-          </a:prstGeom>
-        </p:spPr>
-      </p:pic>
-      <p:sp>
-        <p:nvSpPr>
-          <p:cNvPr id="3" name="Rectangle 2"/>
-          <p:cNvSpPr/>
-          <p:nvPr/>
-        </p:nvSpPr>
-        <p:spPr>
-          <a:xfrm>
-            <a:off x="971600" y="5877272"/>
-            <a:ext cx="3024336" cy="369332"/>
-          </a:xfrm>
-          <a:prstGeom prst="rect">
-            <a:avLst/>
-          </a:prstGeom>
-        </p:spPr>
-        <p:txBody>
-          <a:bodyPr wrap="square">
-            <a:spAutoFit/>
-          </a:bodyPr>
-          <a:lstStyle/>
-          <a:p>
-            <a:pPr marL="171450" indent="-171450">
-              <a:buFont typeface="Wingdings" panose="05000000000000000000" pitchFamily="2" charset="2"/>
-              <a:buChar char="Ø"/>
-            </a:pPr>
-            <a:r>
-              <a:rPr lang="fr-CH" u="sng" dirty="0" smtClean="0">
-                <a:solidFill>
-                  <a:srgbClr val="0563C1"/>
-                </a:solidFill>
-                <a:latin typeface="Times New Roman" panose="02020603050405020304" pitchFamily="18" charset="0"/>
-                <a:hlinkClick r:id="rId3"/>
-              </a:rPr>
-              <a:t>L</a:t>
-            </a:r>
-            <a:r>
-              <a:rPr lang="fr-CH" u="sng" dirty="0" smtClean="0">
-                <a:solidFill>
-                  <a:srgbClr val="0563C1"/>
-                </a:solidFill>
-                <a:latin typeface="Times New Roman" panose="02020603050405020304" pitchFamily="18" charset="0"/>
-              </a:rPr>
-              <a:t>ive </a:t>
-            </a:r>
-            <a:r>
-              <a:rPr lang="fr-CH" u="sng" dirty="0" err="1" smtClean="0">
-                <a:solidFill>
-                  <a:srgbClr val="0563C1"/>
-                </a:solidFill>
-                <a:latin typeface="Times New Roman" panose="02020603050405020304" pitchFamily="18" charset="0"/>
-              </a:rPr>
-              <a:t>coding</a:t>
-            </a:r>
-            <a:r>
-              <a:rPr lang="fr-CH" u="sng" smtClean="0">
-                <a:solidFill>
-                  <a:srgbClr val="0563C1"/>
-                </a:solidFill>
-                <a:latin typeface="Times New Roman" panose="02020603050405020304" pitchFamily="18" charset="0"/>
-              </a:rPr>
-              <a:t> session</a:t>
-            </a:r>
-            <a:endParaRPr lang="fr-CH" dirty="0">
-              <a:solidFill>
-                <a:srgbClr val="0563C1"/>
-              </a:solidFill>
-              <a:latin typeface="Times New Roman" panose="02020603050405020304" pitchFamily="18" charset="0"/>
-              <a:hlinkClick r:id="rId3"/>
-            </a:endParaRPr>
-          </a:p>
-        </p:txBody>
-      </p:sp>
-    </p:spTree>
-    <p:extLst>
-      <p:ext uri="{BB962C8B-B14F-4D97-AF65-F5344CB8AC3E}">
-        <p14:creationId xmlns:p14="http://schemas.microsoft.com/office/powerpoint/2010/main" val="3122517294"/>
-      </p:ext>
-    </p:extLst>
-  </p:cSld>
-  <p:clrMapOvr>
-    <a:masterClrMapping/>
-  </p:clrMapOvr>
-  <p:timing>
-    <p:tnLst>
-      <p:par>
-        <p:cTn id="1" dur="indefinite" restart="never" nodeType="tmRoot"/>
-      </p:par>
-    </p:tnLst>
-  </p:timing>
-</p:sld>
-</file>
-
-<file path=ppt/slides/slide52.xml><?xml version="1.0" encoding="utf-8"?>
-<p:sld xmlns:a="http://schemas.openxmlformats.org/drawingml/2006/main" xmlns:r="http://schemas.openxmlformats.org/officeDocument/2006/relationships" xmlns:p="http://schemas.openxmlformats.org/presentationml/2006/main">
-  <p:cSld>
-    <p:spTree>
-      <p:nvGrpSpPr>
-        <p:cNvPr id="1" name=""/>
-        <p:cNvGrpSpPr/>
-        <p:nvPr/>
-      </p:nvGrpSpPr>
-      <p:grpSpPr>
-        <a:xfrm>
-          <a:off x="0" y="0"/>
-          <a:ext cx="0" cy="0"/>
-          <a:chOff x="0" y="0"/>
-          <a:chExt cx="0" cy="0"/>
-        </a:xfrm>
-      </p:grpSpPr>
-      <p:sp>
-        <p:nvSpPr>
-          <p:cNvPr id="2" name="Title 1"/>
-          <p:cNvSpPr>
-            <a:spLocks noGrp="1"/>
-          </p:cNvSpPr>
-          <p:nvPr>
-            <p:ph type="title"/>
-          </p:nvPr>
-        </p:nvSpPr>
-        <p:spPr/>
-        <p:txBody>
-          <a:bodyPr/>
-          <a:lstStyle/>
-          <a:p>
-            <a:r>
-              <a:rPr lang="fr-CH" dirty="0" err="1" smtClean="0"/>
-              <a:t>Specifying</a:t>
-            </a:r>
-            <a:r>
-              <a:rPr lang="fr-CH" dirty="0" smtClean="0"/>
-              <a:t> the modules </a:t>
-            </a:r>
-            <a:r>
-              <a:rPr lang="fr-CH" dirty="0" err="1" smtClean="0"/>
-              <a:t>features</a:t>
-            </a:r>
-            <a:endParaRPr lang="de-CH" dirty="0"/>
-          </a:p>
-        </p:txBody>
-      </p:sp>
-      <p:sp>
-        <p:nvSpPr>
-          <p:cNvPr id="7" name="Content Placeholder 6"/>
-          <p:cNvSpPr>
-            <a:spLocks noGrp="1"/>
-          </p:cNvSpPr>
-          <p:nvPr>
-            <p:ph idx="1"/>
-          </p:nvPr>
-        </p:nvSpPr>
-        <p:spPr/>
-        <p:txBody>
-          <a:bodyPr/>
-          <a:lstStyle/>
-          <a:p>
-            <a:r>
-              <a:rPr lang="fr-CH" dirty="0" err="1" smtClean="0"/>
-              <a:t>Feature</a:t>
-            </a:r>
-            <a:r>
-              <a:rPr lang="fr-CH" dirty="0" smtClean="0"/>
-              <a:t> files are </a:t>
-            </a:r>
-            <a:r>
-              <a:rPr lang="fr-CH" dirty="0" err="1" smtClean="0"/>
-              <a:t>discussed</a:t>
-            </a:r>
-            <a:r>
-              <a:rPr lang="fr-CH" dirty="0" smtClean="0"/>
-              <a:t> at least in </a:t>
-            </a:r>
-            <a:r>
-              <a:rPr lang="fr-CH" dirty="0" err="1" smtClean="0"/>
-              <a:t>refinement</a:t>
-            </a:r>
-            <a:r>
-              <a:rPr lang="fr-CH" dirty="0" smtClean="0"/>
-              <a:t> sessions </a:t>
-            </a:r>
-            <a:r>
-              <a:rPr lang="fr-CH" dirty="0" err="1" smtClean="0"/>
-              <a:t>together</a:t>
-            </a:r>
-            <a:r>
-              <a:rPr lang="fr-CH" dirty="0" smtClean="0"/>
-              <a:t> </a:t>
-            </a:r>
-            <a:r>
-              <a:rPr lang="fr-CH" dirty="0" err="1" smtClean="0"/>
-              <a:t>with</a:t>
-            </a:r>
-            <a:endParaRPr lang="fr-CH" dirty="0" smtClean="0"/>
-          </a:p>
-          <a:p>
-            <a:pPr lvl="1"/>
-            <a:r>
-              <a:rPr lang="fr-CH" dirty="0" smtClean="0"/>
-              <a:t>PO</a:t>
-            </a:r>
-          </a:p>
-          <a:p>
-            <a:pPr lvl="1"/>
-            <a:r>
-              <a:rPr lang="fr-CH" dirty="0" err="1" smtClean="0"/>
-              <a:t>Developers</a:t>
-            </a:r>
-            <a:endParaRPr lang="fr-CH" dirty="0" smtClean="0"/>
-          </a:p>
-          <a:p>
-            <a:pPr lvl="1"/>
-            <a:r>
-              <a:rPr lang="fr-CH" dirty="0" err="1" smtClean="0"/>
-              <a:t>Testers</a:t>
-            </a:r>
-            <a:endParaRPr lang="fr-CH" dirty="0" smtClean="0"/>
-          </a:p>
-          <a:p>
-            <a:pPr lvl="1"/>
-            <a:endParaRPr lang="fr-CH" dirty="0" smtClean="0"/>
-          </a:p>
-          <a:p>
-            <a:r>
-              <a:rPr lang="fr-CH" dirty="0" err="1"/>
-              <a:t>Feature</a:t>
-            </a:r>
-            <a:r>
-              <a:rPr lang="fr-CH" dirty="0"/>
-              <a:t> files are </a:t>
-            </a:r>
-            <a:r>
-              <a:rPr lang="fr-CH" dirty="0" err="1"/>
-              <a:t>ready</a:t>
-            </a:r>
-            <a:r>
-              <a:rPr lang="fr-CH" dirty="0"/>
-              <a:t> </a:t>
-            </a:r>
-            <a:r>
-              <a:rPr lang="fr-CH" dirty="0" err="1"/>
-              <a:t>before</a:t>
-            </a:r>
-            <a:r>
-              <a:rPr lang="fr-CH" dirty="0"/>
-              <a:t> the </a:t>
-            </a:r>
-            <a:r>
-              <a:rPr lang="fr-CH" dirty="0" err="1"/>
-              <a:t>next</a:t>
-            </a:r>
-            <a:r>
-              <a:rPr lang="fr-CH" dirty="0"/>
-              <a:t> </a:t>
-            </a:r>
-            <a:r>
-              <a:rPr lang="fr-CH" dirty="0" smtClean="0"/>
-              <a:t>sprint</a:t>
-            </a:r>
-          </a:p>
-          <a:p>
-            <a:pPr marL="0" indent="0">
-              <a:buNone/>
-            </a:pPr>
-            <a:endParaRPr lang="fr-CH" dirty="0" smtClean="0"/>
-          </a:p>
-          <a:p>
-            <a:r>
-              <a:rPr lang="fr-CH" dirty="0" err="1" smtClean="0"/>
-              <a:t>Ideally</a:t>
-            </a:r>
-            <a:r>
-              <a:rPr lang="fr-CH" dirty="0" smtClean="0"/>
-              <a:t> the </a:t>
-            </a:r>
-            <a:r>
-              <a:rPr lang="fr-CH" dirty="0" err="1" smtClean="0"/>
-              <a:t>acceptance</a:t>
-            </a:r>
-            <a:r>
-              <a:rPr lang="fr-CH" dirty="0" smtClean="0"/>
-              <a:t> tests are </a:t>
-            </a:r>
-            <a:r>
-              <a:rPr lang="fr-CH" dirty="0" err="1" smtClean="0"/>
-              <a:t>written</a:t>
-            </a:r>
-            <a:r>
-              <a:rPr lang="fr-CH" dirty="0" smtClean="0"/>
-              <a:t> </a:t>
-            </a:r>
-            <a:r>
-              <a:rPr lang="fr-CH" dirty="0" err="1" smtClean="0"/>
-              <a:t>before</a:t>
-            </a:r>
-            <a:r>
-              <a:rPr lang="fr-CH" dirty="0" smtClean="0"/>
-              <a:t> the </a:t>
-            </a:r>
-            <a:r>
-              <a:rPr lang="fr-CH" dirty="0" err="1" smtClean="0"/>
-              <a:t>next</a:t>
-            </a:r>
-            <a:r>
-              <a:rPr lang="fr-CH" dirty="0" smtClean="0"/>
-              <a:t> sprint </a:t>
-            </a:r>
-            <a:r>
-              <a:rPr lang="fr-CH" dirty="0" err="1" smtClean="0"/>
-              <a:t>because</a:t>
-            </a:r>
-            <a:r>
-              <a:rPr lang="fr-CH" dirty="0" smtClean="0"/>
-              <a:t> </a:t>
-            </a:r>
-            <a:r>
-              <a:rPr lang="fr-CH" dirty="0" err="1" smtClean="0"/>
-              <a:t>their</a:t>
-            </a:r>
-            <a:r>
-              <a:rPr lang="fr-CH" dirty="0" smtClean="0"/>
-              <a:t> </a:t>
-            </a:r>
-            <a:r>
-              <a:rPr lang="fr-CH" dirty="0" err="1" smtClean="0"/>
-              <a:t>writing</a:t>
-            </a:r>
-            <a:r>
-              <a:rPr lang="fr-CH" dirty="0" smtClean="0"/>
-              <a:t> </a:t>
-            </a:r>
-            <a:r>
-              <a:rPr lang="fr-CH" dirty="0" err="1" smtClean="0"/>
-              <a:t>addresses</a:t>
-            </a:r>
-            <a:r>
-              <a:rPr lang="fr-CH" dirty="0" smtClean="0"/>
-              <a:t> architecture / software design </a:t>
-            </a:r>
-            <a:r>
-              <a:rPr lang="fr-CH" dirty="0" err="1" smtClean="0"/>
-              <a:t>which</a:t>
-            </a:r>
-            <a:r>
-              <a:rPr lang="fr-CH" dirty="0" smtClean="0"/>
-              <a:t> </a:t>
-            </a:r>
-            <a:r>
-              <a:rPr lang="fr-CH" dirty="0" err="1" smtClean="0"/>
-              <a:t>eases</a:t>
-            </a:r>
-            <a:r>
-              <a:rPr lang="fr-CH" dirty="0" smtClean="0"/>
-              <a:t> estimation</a:t>
-            </a:r>
-            <a:endParaRPr lang="fr-CH" dirty="0"/>
-          </a:p>
-          <a:p>
-            <a:endParaRPr lang="de-CH" dirty="0"/>
-          </a:p>
-        </p:txBody>
-      </p:sp>
-      <p:sp>
-        <p:nvSpPr>
-          <p:cNvPr id="4" name="Subtitle 3"/>
-          <p:cNvSpPr>
-            <a:spLocks noGrp="1"/>
-          </p:cNvSpPr>
-          <p:nvPr>
-            <p:ph type="subTitle" idx="13"/>
-          </p:nvPr>
-        </p:nvSpPr>
-        <p:spPr/>
-        <p:txBody>
-          <a:bodyPr/>
-          <a:lstStyle/>
-          <a:p>
-            <a:r>
-              <a:rPr lang="fr-CH" dirty="0" smtClean="0"/>
-              <a:t>Planning </a:t>
-            </a:r>
-            <a:r>
-              <a:rPr lang="fr-CH" dirty="0" err="1" smtClean="0"/>
-              <a:t>work</a:t>
-            </a:r>
-            <a:r>
-              <a:rPr lang="fr-CH" dirty="0" smtClean="0"/>
-              <a:t> </a:t>
-            </a:r>
-            <a:r>
-              <a:rPr lang="fr-CH" dirty="0" err="1" smtClean="0"/>
-              <a:t>with</a:t>
-            </a:r>
-            <a:r>
-              <a:rPr lang="fr-CH" dirty="0" smtClean="0"/>
-              <a:t> user stories</a:t>
-            </a:r>
-            <a:endParaRPr lang="de-CH" dirty="0"/>
-          </a:p>
-        </p:txBody>
-      </p:sp>
-    </p:spTree>
-    <p:extLst>
-      <p:ext uri="{BB962C8B-B14F-4D97-AF65-F5344CB8AC3E}">
-        <p14:creationId xmlns:p14="http://schemas.microsoft.com/office/powerpoint/2010/main" val="367646449"/>
       </p:ext>
     </p:extLst>
   </p:cSld>

</xml_diff>